<commit_message>
Update DG for delete_person
</commit_message>
<xml_diff>
--- a/docs/diagrams/DeletePersonObjectDiagram.pptx
+++ b/docs/diagrams/DeletePersonObjectDiagram.pptx
@@ -3406,13 +3406,13 @@
               <a:t>:</a:t>
             </a:r>
             <a:r>
-              <a:rPr lang="en-US" sz="1000" dirty="0" err="1">
+              <a:rPr lang="en-US" sz="1000" u="sng" dirty="0" err="1">
                 <a:latin typeface="Arial" panose="020B0604020202020204" pitchFamily="34" charset="0"/>
                 <a:cs typeface="Arial" panose="020B0604020202020204" pitchFamily="34" charset="0"/>
               </a:rPr>
               <a:t>AddressBook</a:t>
             </a:r>
-            <a:endParaRPr lang="en-US" sz="1000" dirty="0">
+            <a:endParaRPr lang="en-US" sz="1000" u="sng" dirty="0">
               <a:latin typeface="Arial" panose="020B0604020202020204" pitchFamily="34" charset="0"/>
               <a:cs typeface="Arial" panose="020B0604020202020204" pitchFamily="34" charset="0"/>
             </a:endParaRPr>
@@ -3470,13 +3470,13 @@
           <a:p>
             <a:pPr algn="ctr"/>
             <a:r>
-              <a:rPr lang="en-US" sz="1000" dirty="0" err="1">
+              <a:rPr lang="en-US" sz="1000" u="sng" dirty="0" err="1">
                 <a:latin typeface="Arial" panose="020B0604020202020204" pitchFamily="34" charset="0"/>
                 <a:cs typeface="Arial" panose="020B0604020202020204" pitchFamily="34" charset="0"/>
               </a:rPr>
               <a:t>persons:UniquePersonList</a:t>
             </a:r>
-            <a:endParaRPr lang="en-US" sz="1000" dirty="0">
+            <a:endParaRPr lang="en-US" sz="1000" u="sng" dirty="0">
               <a:latin typeface="Arial" panose="020B0604020202020204" pitchFamily="34" charset="0"/>
               <a:cs typeface="Arial" panose="020B0604020202020204" pitchFamily="34" charset="0"/>
             </a:endParaRPr>
@@ -3536,7 +3536,7 @@
           <a:p>
             <a:pPr algn="ctr"/>
             <a:r>
-              <a:rPr lang="en-US" sz="1000" dirty="0">
+              <a:rPr lang="en-US" sz="1000" u="sng" dirty="0">
                 <a:latin typeface="Arial" panose="020B0604020202020204" pitchFamily="34" charset="0"/>
                 <a:cs typeface="Arial" panose="020B0604020202020204" pitchFamily="34" charset="0"/>
               </a:rPr>
@@ -3731,7 +3731,7 @@
           <a:p>
             <a:pPr algn="ctr"/>
             <a:r>
-              <a:rPr lang="en-US" sz="1000" dirty="0">
+              <a:rPr lang="en-US" sz="1000" u="sng" dirty="0">
                 <a:latin typeface="Arial" panose="020B0604020202020204" pitchFamily="34" charset="0"/>
                 <a:cs typeface="Arial" panose="020B0604020202020204" pitchFamily="34" charset="0"/>
               </a:rPr>
@@ -3793,7 +3793,7 @@
           <a:p>
             <a:pPr algn="ctr"/>
             <a:r>
-              <a:rPr lang="en-US" sz="1000" dirty="0">
+              <a:rPr lang="en-US" sz="1000" u="sng" dirty="0">
                 <a:latin typeface="Arial" panose="020B0604020202020204" pitchFamily="34" charset="0"/>
                 <a:cs typeface="Arial" panose="020B0604020202020204" pitchFamily="34" charset="0"/>
               </a:rPr>
@@ -4193,20 +4193,20 @@
           <a:p>
             <a:pPr algn="ctr"/>
             <a:r>
-              <a:rPr lang="en-US" sz="1000" dirty="0">
+              <a:rPr lang="en-US" sz="1000" u="sng" dirty="0">
                 <a:latin typeface="Arial" panose="020B0604020202020204" pitchFamily="34" charset="0"/>
                 <a:cs typeface="Arial" panose="020B0604020202020204" pitchFamily="34" charset="0"/>
               </a:rPr>
               <a:t>:</a:t>
             </a:r>
             <a:r>
-              <a:rPr lang="en-US" sz="1000" dirty="0" err="1">
+              <a:rPr lang="en-US" sz="1000" u="sng" dirty="0" err="1">
                 <a:latin typeface="Arial" panose="020B0604020202020204" pitchFamily="34" charset="0"/>
                 <a:cs typeface="Arial" panose="020B0604020202020204" pitchFamily="34" charset="0"/>
               </a:rPr>
               <a:t>AddressBook</a:t>
             </a:r>
-            <a:endParaRPr lang="en-US" sz="1000" dirty="0">
+            <a:endParaRPr lang="en-US" sz="1000" u="sng" dirty="0">
               <a:latin typeface="Arial" panose="020B0604020202020204" pitchFamily="34" charset="0"/>
               <a:cs typeface="Arial" panose="020B0604020202020204" pitchFamily="34" charset="0"/>
             </a:endParaRPr>
@@ -4264,13 +4264,13 @@
           <a:p>
             <a:pPr algn="ctr"/>
             <a:r>
-              <a:rPr lang="en-US" sz="1000" dirty="0" err="1">
+              <a:rPr lang="en-US" sz="1000" u="sng" dirty="0" err="1">
                 <a:latin typeface="Arial" panose="020B0604020202020204" pitchFamily="34" charset="0"/>
                 <a:cs typeface="Arial" panose="020B0604020202020204" pitchFamily="34" charset="0"/>
               </a:rPr>
               <a:t>persons:UniquePersonList</a:t>
             </a:r>
-            <a:endParaRPr lang="en-US" sz="1000" dirty="0">
+            <a:endParaRPr lang="en-US" sz="1000" u="sng" dirty="0">
               <a:latin typeface="Arial" panose="020B0604020202020204" pitchFamily="34" charset="0"/>
               <a:cs typeface="Arial" panose="020B0604020202020204" pitchFamily="34" charset="0"/>
             </a:endParaRPr>
@@ -4330,7 +4330,7 @@
           <a:p>
             <a:pPr algn="ctr"/>
             <a:r>
-              <a:rPr lang="en-US" sz="1000" dirty="0">
+              <a:rPr lang="en-US" sz="1000" u="sng" dirty="0">
                 <a:latin typeface="Arial" panose="020B0604020202020204" pitchFamily="34" charset="0"/>
                 <a:cs typeface="Arial" panose="020B0604020202020204" pitchFamily="34" charset="0"/>
               </a:rPr>
@@ -4539,7 +4539,7 @@
           <a:p>
             <a:pPr algn="ctr"/>
             <a:r>
-              <a:rPr lang="en-US" sz="1000" dirty="0">
+              <a:rPr lang="en-US" sz="1000" u="sng" dirty="0">
                 <a:latin typeface="Arial" panose="020B0604020202020204" pitchFamily="34" charset="0"/>
                 <a:cs typeface="Arial" panose="020B0604020202020204" pitchFamily="34" charset="0"/>
               </a:rPr>

</xml_diff>